<commit_message>
Add Images for schematic and PCB versions
</commit_message>
<xml_diff>
--- a/RF_Wattmeter_Teensy41_PCB_V1/Docs/Teensy 4.1 RF Wattmeter and Band Decoder Project.pptx
+++ b/RF_Wattmeter_Teensy41_PCB_V1/Docs/Teensy 4.1 RF Wattmeter and Band Decoder Project.pptx
@@ -109,6 +109,11 @@
       </a:defRPr>
     </a:lvl9pPr>
   </p:defaultTextStyle>
+  <p:extLst>
+    <p:ext uri="{EFAFB233-063F-42B5-8137-9DF3F51BA10A}">
+      <p15:sldGuideLst xmlns:p15="http://schemas.microsoft.com/office/powerpoint/2012/main"/>
+    </p:ext>
+  </p:extLst>
 </p:presentation>
 </file>
 
@@ -259,7 +264,7 @@
           <a:p>
             <a:fld id="{FD51EC3C-FFB8-4B14-935A-46D115230994}" type="datetimeFigureOut">
               <a:rPr lang="en-US" smtClean="0"/>
-              <a:t>4/11/2022</a:t>
+              <a:t>4/8/2024</a:t>
             </a:fld>
             <a:endParaRPr lang="en-US"/>
           </a:p>
@@ -457,7 +462,7 @@
           <a:p>
             <a:fld id="{FD51EC3C-FFB8-4B14-935A-46D115230994}" type="datetimeFigureOut">
               <a:rPr lang="en-US" smtClean="0"/>
-              <a:t>4/11/2022</a:t>
+              <a:t>4/8/2024</a:t>
             </a:fld>
             <a:endParaRPr lang="en-US"/>
           </a:p>
@@ -665,7 +670,7 @@
           <a:p>
             <a:fld id="{FD51EC3C-FFB8-4B14-935A-46D115230994}" type="datetimeFigureOut">
               <a:rPr lang="en-US" smtClean="0"/>
-              <a:t>4/11/2022</a:t>
+              <a:t>4/8/2024</a:t>
             </a:fld>
             <a:endParaRPr lang="en-US"/>
           </a:p>
@@ -863,7 +868,7 @@
           <a:p>
             <a:fld id="{FD51EC3C-FFB8-4B14-935A-46D115230994}" type="datetimeFigureOut">
               <a:rPr lang="en-US" smtClean="0"/>
-              <a:t>4/11/2022</a:t>
+              <a:t>4/8/2024</a:t>
             </a:fld>
             <a:endParaRPr lang="en-US"/>
           </a:p>
@@ -1138,7 +1143,7 @@
           <a:p>
             <a:fld id="{FD51EC3C-FFB8-4B14-935A-46D115230994}" type="datetimeFigureOut">
               <a:rPr lang="en-US" smtClean="0"/>
-              <a:t>4/11/2022</a:t>
+              <a:t>4/8/2024</a:t>
             </a:fld>
             <a:endParaRPr lang="en-US"/>
           </a:p>
@@ -1403,7 +1408,7 @@
           <a:p>
             <a:fld id="{FD51EC3C-FFB8-4B14-935A-46D115230994}" type="datetimeFigureOut">
               <a:rPr lang="en-US" smtClean="0"/>
-              <a:t>4/11/2022</a:t>
+              <a:t>4/8/2024</a:t>
             </a:fld>
             <a:endParaRPr lang="en-US"/>
           </a:p>
@@ -1815,7 +1820,7 @@
           <a:p>
             <a:fld id="{FD51EC3C-FFB8-4B14-935A-46D115230994}" type="datetimeFigureOut">
               <a:rPr lang="en-US" smtClean="0"/>
-              <a:t>4/11/2022</a:t>
+              <a:t>4/8/2024</a:t>
             </a:fld>
             <a:endParaRPr lang="en-US"/>
           </a:p>
@@ -1956,7 +1961,7 @@
           <a:p>
             <a:fld id="{FD51EC3C-FFB8-4B14-935A-46D115230994}" type="datetimeFigureOut">
               <a:rPr lang="en-US" smtClean="0"/>
-              <a:t>4/11/2022</a:t>
+              <a:t>4/8/2024</a:t>
             </a:fld>
             <a:endParaRPr lang="en-US"/>
           </a:p>
@@ -2069,7 +2074,7 @@
           <a:p>
             <a:fld id="{FD51EC3C-FFB8-4B14-935A-46D115230994}" type="datetimeFigureOut">
               <a:rPr lang="en-US" smtClean="0"/>
-              <a:t>4/11/2022</a:t>
+              <a:t>4/8/2024</a:t>
             </a:fld>
             <a:endParaRPr lang="en-US"/>
           </a:p>
@@ -2380,7 +2385,7 @@
           <a:p>
             <a:fld id="{FD51EC3C-FFB8-4B14-935A-46D115230994}" type="datetimeFigureOut">
               <a:rPr lang="en-US" smtClean="0"/>
-              <a:t>4/11/2022</a:t>
+              <a:t>4/8/2024</a:t>
             </a:fld>
             <a:endParaRPr lang="en-US"/>
           </a:p>
@@ -2668,7 +2673,7 @@
           <a:p>
             <a:fld id="{FD51EC3C-FFB8-4B14-935A-46D115230994}" type="datetimeFigureOut">
               <a:rPr lang="en-US" smtClean="0"/>
-              <a:t>4/11/2022</a:t>
+              <a:t>4/8/2024</a:t>
             </a:fld>
             <a:endParaRPr lang="en-US"/>
           </a:p>
@@ -2909,7 +2914,7 @@
           <a:p>
             <a:fld id="{FD51EC3C-FFB8-4B14-935A-46D115230994}" type="datetimeFigureOut">
               <a:rPr lang="en-US" smtClean="0"/>
-              <a:t>4/11/2022</a:t>
+              <a:t>4/8/2024</a:t>
             </a:fld>
             <a:endParaRPr lang="en-US"/>
           </a:p>
@@ -3648,7 +3653,7 @@
         <p:spPr>
           <a:xfrm>
             <a:off x="1136914" y="1055131"/>
-            <a:ext cx="9425209" cy="6463308"/>
+            <a:ext cx="7574189" cy="5047536"/>
           </a:xfrm>
           <a:prstGeom prst="rect">
             <a:avLst/>
@@ -3662,139 +3667,139 @@
           <a:lstStyle/>
           <a:p>
             <a:r>
-              <a:rPr lang="en-US" dirty="0"/>
+              <a:rPr lang="en-US" sz="1400" dirty="0"/>
               <a:t>Custom PCB designed for RFI resistance and no wires (antennas!), and board edge connectors.</a:t>
             </a:r>
           </a:p>
           <a:p>
             <a:r>
-              <a:rPr lang="en-US" dirty="0"/>
+              <a:rPr lang="en-US" sz="1400" dirty="0"/>
               <a:t>ADL5519 dual 10GHz rated log power detector module from SV1AFN</a:t>
             </a:r>
           </a:p>
           <a:p>
             <a:r>
-              <a:rPr lang="en-US" dirty="0"/>
+              <a:rPr lang="en-US" sz="1400" dirty="0"/>
               <a:t>	 Has about a 60dB usable range</a:t>
             </a:r>
           </a:p>
           <a:p>
             <a:r>
-              <a:rPr lang="en-US" dirty="0"/>
+              <a:rPr lang="en-US" sz="1400" dirty="0"/>
               <a:t>ADS1115 4 cha 16bit ADC with onboard precision voltage refence and programmable PGA</a:t>
             </a:r>
           </a:p>
           <a:p>
             <a:r>
-              <a:rPr lang="en-US" dirty="0"/>
+              <a:rPr lang="en-US" sz="1400" dirty="0"/>
               <a:t>	Common online part</a:t>
             </a:r>
           </a:p>
           <a:p>
             <a:r>
-              <a:rPr lang="en-US" dirty="0"/>
+              <a:rPr lang="en-US" sz="1400" dirty="0"/>
               <a:t>Front panel </a:t>
             </a:r>
           </a:p>
           <a:p>
             <a:r>
-              <a:rPr lang="en-US" dirty="0"/>
+              <a:rPr lang="en-US" sz="1400" dirty="0"/>
               <a:t>	Power switch and LED</a:t>
             </a:r>
           </a:p>
           <a:p>
             <a:r>
-              <a:rPr lang="en-US" dirty="0"/>
+              <a:rPr lang="en-US" sz="1400" dirty="0"/>
               <a:t>	Ethernet jack</a:t>
             </a:r>
           </a:p>
           <a:p>
             <a:r>
-              <a:rPr lang="en-US" dirty="0"/>
+              <a:rPr lang="en-US" sz="1400" dirty="0"/>
               <a:t>	Optional displays</a:t>
             </a:r>
           </a:p>
           <a:p>
             <a:r>
-              <a:rPr lang="en-US" dirty="0"/>
+              <a:rPr lang="en-US" sz="1400" dirty="0"/>
               <a:t>	Host USB2 port (future use)</a:t>
             </a:r>
           </a:p>
           <a:p>
             <a:r>
-              <a:rPr lang="en-US" dirty="0"/>
+              <a:rPr lang="en-US" sz="1400" dirty="0"/>
               <a:t>	Teensy USB connector</a:t>
             </a:r>
           </a:p>
           <a:p>
             <a:r>
-              <a:rPr lang="en-US" dirty="0"/>
+              <a:rPr lang="en-US" sz="1400" dirty="0"/>
               <a:t>Input port on DB9 female connector using Opto-Couplers</a:t>
             </a:r>
           </a:p>
           <a:p>
             <a:r>
-              <a:rPr lang="en-US" dirty="0"/>
+              <a:rPr lang="en-US" sz="1400" dirty="0"/>
               <a:t>	6x lines for band selection along</a:t>
             </a:r>
           </a:p>
           <a:p>
             <a:r>
-              <a:rPr lang="en-US" dirty="0"/>
+              <a:rPr lang="en-US" sz="1400" dirty="0"/>
               <a:t>	PTT input line</a:t>
             </a:r>
           </a:p>
           <a:p>
             <a:r>
-              <a:rPr lang="en-US" dirty="0"/>
+              <a:rPr lang="en-US" sz="1400" dirty="0"/>
               <a:t>Output Ports on Stacked female D-Sub 15 pin connectors, uses Opto-Couplers</a:t>
             </a:r>
           </a:p>
           <a:p>
             <a:r>
-              <a:rPr lang="en-US" dirty="0"/>
+              <a:rPr lang="en-US" sz="1400" dirty="0"/>
               <a:t>	Port A - 8-lines, PTT1 output, low current 12V</a:t>
             </a:r>
           </a:p>
           <a:p>
             <a:r>
-              <a:rPr lang="en-US" dirty="0"/>
+              <a:rPr lang="en-US" sz="1400" dirty="0"/>
               <a:t>	Port B - 8-lines, PTT2 output, low current 12V</a:t>
             </a:r>
           </a:p>
           <a:p>
             <a:r>
-              <a:rPr lang="en-US" dirty="0"/>
+              <a:rPr lang="en-US" sz="1400" dirty="0"/>
               <a:t>2 separate PTT outputs, PTT1 and PTT2</a:t>
             </a:r>
           </a:p>
           <a:p>
             <a:r>
-              <a:rPr lang="en-US" dirty="0"/>
+              <a:rPr lang="en-US" sz="1400" dirty="0"/>
               <a:t>	Both tied together in software today, can be separated for sequencing with minor coding</a:t>
             </a:r>
           </a:p>
           <a:p>
             <a:r>
-              <a:rPr lang="en-US" dirty="0"/>
+              <a:rPr lang="en-US" sz="1400" dirty="0"/>
               <a:t>	One on each output port connector</a:t>
             </a:r>
           </a:p>
           <a:p>
             <a:r>
-              <a:rPr lang="en-US" dirty="0"/>
+              <a:rPr lang="en-US" sz="1400" dirty="0"/>
               <a:t>	PTT1 is also presented on a RCA jack</a:t>
             </a:r>
           </a:p>
           <a:p>
             <a:r>
-              <a:rPr lang="en-US" dirty="0"/>
+              <a:rPr lang="en-US" sz="1400" dirty="0"/>
               <a:t>12V powered via coaxial DC power jack</a:t>
             </a:r>
           </a:p>
           <a:p>
             <a:r>
-              <a:rPr lang="en-US" dirty="0"/>
+              <a:rPr lang="en-US" sz="1400" dirty="0"/>
               <a:t> </a:t>
             </a:r>
           </a:p>
@@ -3880,7 +3885,7 @@
         <p:spPr>
           <a:xfrm>
             <a:off x="1062318" y="866873"/>
-            <a:ext cx="9427966" cy="7017306"/>
+            <a:ext cx="7367914" cy="5478423"/>
           </a:xfrm>
           <a:prstGeom prst="rect">
             <a:avLst/>
@@ -3894,150 +3899,150 @@
           <a:lstStyle/>
           <a:p>
             <a:r>
-              <a:rPr lang="en-US" dirty="0"/>
+              <a:rPr lang="en-US" sz="1400" dirty="0"/>
               <a:t>Sized to slides into a common metal case from online</a:t>
             </a:r>
           </a:p>
           <a:p>
             <a:r>
-              <a:rPr lang="en-US" dirty="0"/>
+              <a:rPr lang="en-US" sz="1400" dirty="0"/>
               <a:t>Choice of 2 displays, if any used</a:t>
             </a:r>
           </a:p>
           <a:p>
             <a:r>
-              <a:rPr lang="en-US" dirty="0"/>
+              <a:rPr lang="en-US" sz="1400" dirty="0"/>
               <a:t>PCB designed to be RFI resistant.</a:t>
             </a:r>
           </a:p>
           <a:p>
             <a:r>
-              <a:rPr lang="en-US" dirty="0"/>
+              <a:rPr lang="en-US" sz="1400" dirty="0"/>
               <a:t>	Opto-Couplers on all input and output ports</a:t>
             </a:r>
           </a:p>
           <a:p>
             <a:r>
-              <a:rPr lang="en-US" dirty="0"/>
+              <a:rPr lang="en-US" sz="1400" dirty="0"/>
               <a:t>	Very short lines from the connectors to minimize RF radiation inside the box</a:t>
             </a:r>
           </a:p>
           <a:p>
             <a:r>
-              <a:rPr lang="en-US" dirty="0"/>
+              <a:rPr lang="en-US" sz="1400" dirty="0"/>
               <a:t>	Only wires are from the PCB to a display if used, all are filtered</a:t>
             </a:r>
           </a:p>
           <a:p>
             <a:r>
-              <a:rPr lang="en-US" dirty="0"/>
+              <a:rPr lang="en-US" sz="1400" dirty="0"/>
               <a:t>	Input lines to optocoupler bypassed</a:t>
             </a:r>
           </a:p>
           <a:p>
             <a:r>
-              <a:rPr lang="en-US" dirty="0"/>
+              <a:rPr lang="en-US" sz="1400" dirty="0"/>
               <a:t>	12V Power and Display power lines filtered</a:t>
             </a:r>
           </a:p>
           <a:p>
             <a:r>
-              <a:rPr lang="en-US" dirty="0"/>
+              <a:rPr lang="en-US" sz="1400" dirty="0"/>
               <a:t>	OLED i2c SCL an SDA data lines are also filtered</a:t>
             </a:r>
           </a:p>
           <a:p>
             <a:r>
-              <a:rPr lang="en-US" dirty="0"/>
+              <a:rPr lang="en-US" sz="1400" dirty="0"/>
               <a:t>Choice of 12V to 5V power – 7805 or DC-DC converters such as LC78_05-3.0, or isolated converters</a:t>
             </a:r>
           </a:p>
           <a:p>
             <a:r>
-              <a:rPr lang="en-US" dirty="0"/>
+              <a:rPr lang="en-US" sz="1400" dirty="0"/>
               <a:t>Pico fuse soldered in.  </a:t>
             </a:r>
           </a:p>
           <a:p>
             <a:r>
-              <a:rPr lang="en-US" dirty="0"/>
+              <a:rPr lang="en-US" sz="1400" dirty="0"/>
               <a:t>Diode reverse polarity protection</a:t>
             </a:r>
           </a:p>
           <a:p>
             <a:r>
-              <a:rPr lang="en-US" dirty="0"/>
+              <a:rPr lang="en-US" sz="1400" dirty="0"/>
               <a:t>Mounting holes if slide-in case not used.</a:t>
             </a:r>
           </a:p>
           <a:p>
             <a:r>
-              <a:rPr lang="en-US" dirty="0"/>
+              <a:rPr lang="en-US" sz="1400" dirty="0"/>
               <a:t>Extra mounting holes in middle for mounting daughter cards on standoffs for future stuff</a:t>
             </a:r>
           </a:p>
           <a:p>
             <a:r>
-              <a:rPr lang="en-US" dirty="0"/>
+              <a:rPr lang="en-US" sz="1400" dirty="0"/>
               <a:t>2 pin connector on the switched 12V for optional external watchdog power interrupt</a:t>
             </a:r>
           </a:p>
           <a:p>
             <a:r>
-              <a:rPr lang="en-US" dirty="0"/>
+              <a:rPr lang="en-US" sz="1400" dirty="0"/>
               <a:t>	2x Watchdog output lines (WD1 and WD2)</a:t>
             </a:r>
           </a:p>
           <a:p>
             <a:r>
-              <a:rPr lang="en-US" dirty="0"/>
+              <a:rPr lang="en-US" sz="1400" dirty="0"/>
               <a:t>	Using Teensy 4 internal watchdog timer that can also trigger one the 2 WD lines</a:t>
             </a:r>
           </a:p>
           <a:p>
             <a:r>
-              <a:rPr lang="en-US" dirty="0"/>
+              <a:rPr lang="en-US" sz="1400" dirty="0"/>
               <a:t>12V and %v aux power connectors</a:t>
             </a:r>
           </a:p>
           <a:p>
             <a:r>
-              <a:rPr lang="en-US" dirty="0"/>
+              <a:rPr lang="en-US" sz="1400" dirty="0"/>
               <a:t>4x analog sensor inputs with voltage dividers or current limit resistors.  </a:t>
             </a:r>
           </a:p>
           <a:p>
             <a:r>
-              <a:rPr lang="en-US" dirty="0"/>
+              <a:rPr lang="en-US" sz="1400" dirty="0"/>
               <a:t>	Software labels set to assume one is HV (high voltage) such as 28 or 50V</a:t>
             </a:r>
           </a:p>
           <a:p>
             <a:r>
-              <a:rPr lang="en-US" dirty="0"/>
+              <a:rPr lang="en-US" sz="1400" dirty="0"/>
               <a:t>	1 input can be set up to measure PCB 12V or an external voltage</a:t>
             </a:r>
           </a:p>
           <a:p>
             <a:r>
-              <a:rPr lang="en-US" dirty="0"/>
+              <a:rPr lang="en-US" sz="1400" dirty="0"/>
               <a:t>	1 is current</a:t>
             </a:r>
           </a:p>
           <a:p>
             <a:r>
-              <a:rPr lang="en-US" dirty="0"/>
+              <a:rPr lang="en-US" sz="1400" dirty="0"/>
               <a:t>	1 is wired to the ADL5519 onboard temp sensor.  </a:t>
             </a:r>
           </a:p>
           <a:p>
             <a:r>
-              <a:rPr lang="en-US" dirty="0"/>
+              <a:rPr lang="en-US" sz="1400" dirty="0"/>
               <a:t>		Could be used for temp correction for even greater accuracy</a:t>
             </a:r>
           </a:p>
           <a:p>
-            <a:endParaRPr lang="en-US" dirty="0"/>
+            <a:endParaRPr lang="en-US" sz="1400" dirty="0"/>
           </a:p>
         </p:txBody>
       </p:sp>

</xml_diff>